<commit_message>
PA28-024 update slides for NFM2017
Change-Id: I025de9a4d8179850dc556c9b5dc3ab14b5831d32
</commit_message>
<xml_diff>
--- a/slides/NFM_2017/NFM_2017.pptx
+++ b/slides/NFM_2017/NFM_2017.pptx
@@ -1171,7 +1171,7 @@
           <a:p>
             <a:fld id="{3862069E-068B-4607-B7F1-F057000853A5}" type="datetimeFigureOut">
               <a:rPr lang="en-US" smtClean="0"/>
-              <a:t>5/10/2017</a:t>
+              <a:t>5/11/2017</a:t>
             </a:fld>
             <a:endParaRPr lang="en-US"/>
           </a:p>
@@ -1483,7 +1483,23 @@
           <a:bodyPr/>
           <a:lstStyle/>
           <a:p>
-            <a:endParaRPr lang="en-US"/>
+            <a:r>
+              <a:rPr lang="en-US" dirty="0"/>
+              <a:t>Good afternoon. My name is Claire Dross, and I work at </a:t>
+            </a:r>
+            <a:r>
+              <a:rPr lang="en-US" dirty="0" err="1"/>
+              <a:t>AdaCore</a:t>
+            </a:r>
+            <a:r>
+              <a:rPr lang="en-US" dirty="0"/>
+              <a:t>, a company</a:t>
+            </a:r>
+            <a:r>
+              <a:rPr lang="en-US" baseline="0" dirty="0"/>
+              <a:t> providing programming tools, essentially for Ada. My presentation is about…</a:t>
+            </a:r>
+            <a:endParaRPr lang="en-US" dirty="0"/>
           </a:p>
         </p:txBody>
       </p:sp>
@@ -8160,14 +8176,14 @@
             <a:pPr lvl="1"/>
             <a:r>
               <a:rPr lang="en-US" sz="2800" dirty="0"/>
+              <a:t>Paths are sequences of directions</a:t>
+            </a:r>
+          </a:p>
+          <a:p>
+            <a:pPr lvl="1"/>
+            <a:r>
+              <a:rPr lang="en-US" sz="2800" dirty="0"/>
               <a:t>Models are used to express properties in higher layers</a:t>
-            </a:r>
-          </a:p>
-          <a:p>
-            <a:pPr lvl="1"/>
-            <a:r>
-              <a:rPr lang="en-US" sz="2800" dirty="0"/>
-              <a:t>Effects of tree operations on models are specified in their contracts</a:t>
             </a:r>
           </a:p>
         </p:txBody>
@@ -8932,12 +8948,6 @@
             <a:r>
               <a:rPr lang="en-US" sz="3200" dirty="0"/>
               <a:t>A binary tree</a:t>
-            </a:r>
-          </a:p>
-          <a:p>
-            <a:r>
-              <a:rPr lang="en-US" sz="3200" dirty="0"/>
-              <a:t>A specific root</a:t>
             </a:r>
           </a:p>
           <a:p>
@@ -10911,7 +10921,7 @@
           <a:p>
             <a:r>
               <a:rPr lang="en-US" sz="3200" dirty="0"/>
-              <a:t>Search and Insert </a:t>
+              <a:t>Lookup and Insert </a:t>
             </a:r>
           </a:p>
           <a:p>
@@ -14299,9 +14309,14 @@
           </a:lstStyle>
           <a:p>
             <a:r>
-              <a:rPr lang="en-US" sz="3200" dirty="0"/>
-              <a:t>Self balancing</a:t>
-            </a:r>
+              <a:rPr lang="en-US" sz="3200"/>
+              <a:t>B</a:t>
+            </a:r>
+            <a:r>
+              <a:rPr lang="en-US" sz="3200"/>
+              <a:t>alancing</a:t>
+            </a:r>
+            <a:endParaRPr lang="en-US" sz="3200" dirty="0"/>
           </a:p>
           <a:p>
             <a:pPr lvl="1"/>
@@ -15075,7 +15090,7 @@
           <a:p>
             <a:r>
               <a:rPr lang="en-US" sz="3200" dirty="0"/>
-              <a:t>Search and Insert</a:t>
+              <a:t>Lookup and Insert</a:t>
             </a:r>
           </a:p>
           <a:p>
@@ -24363,7 +24378,7 @@
           <a:p>
             <a:r>
               <a:rPr lang="en-US" sz="3200" dirty="0"/>
-              <a:t>Self-balancing</a:t>
+              <a:t>Balancing</a:t>
             </a:r>
           </a:p>
         </p:txBody>
@@ -24729,55 +24744,45 @@
       </p:sp>
       <p:grpSp>
         <p:nvGrpSpPr>
-          <p:cNvPr id="13" name="Groupe 12"/>
+          <p:cNvPr id="39" name="Groupe 38"/>
           <p:cNvGrpSpPr/>
           <p:nvPr/>
         </p:nvGrpSpPr>
         <p:grpSpPr>
           <a:xfrm>
-            <a:off x="7877856" y="4617386"/>
-            <a:ext cx="874258" cy="1392206"/>
-            <a:chOff x="7877856" y="4617386"/>
-            <a:chExt cx="874258" cy="1392206"/>
+            <a:off x="5067662" y="4975038"/>
+            <a:ext cx="3071802" cy="1411221"/>
+            <a:chOff x="342149" y="4949486"/>
+            <a:chExt cx="3071802" cy="1411221"/>
           </a:xfrm>
         </p:grpSpPr>
         <p:sp>
           <p:nvSpPr>
-            <p:cNvPr id="14" name="Ellipse 13"/>
+            <p:cNvPr id="40" name="Ellipse 39"/>
             <p:cNvSpPr/>
             <p:nvPr/>
           </p:nvSpPr>
           <p:spPr>
             <a:xfrm>
-              <a:off x="8120302" y="5382029"/>
-              <a:ext cx="631812" cy="627563"/>
+              <a:off x="342149" y="4949486"/>
+              <a:ext cx="3071802" cy="1411221"/>
             </a:xfrm>
             <a:prstGeom prst="ellipse">
               <a:avLst/>
             </a:prstGeom>
-            <a:solidFill>
-              <a:srgbClr val="FF0000"/>
-            </a:solidFill>
-            <a:ln>
-              <a:solidFill>
-                <a:srgbClr val="FF0000"/>
-              </a:solidFill>
-            </a:ln>
           </p:spPr>
           <p:style>
-            <a:lnRef idx="2">
-              <a:schemeClr val="accent1">
-                <a:shade val="50000"/>
-              </a:schemeClr>
+            <a:lnRef idx="1">
+              <a:schemeClr val="accent1"/>
             </a:lnRef>
-            <a:fillRef idx="1">
+            <a:fillRef idx="2">
               <a:schemeClr val="accent1"/>
             </a:fillRef>
-            <a:effectRef idx="0">
+            <a:effectRef idx="1">
               <a:schemeClr val="accent1"/>
             </a:effectRef>
             <a:fontRef idx="minor">
-              <a:schemeClr val="lt1"/>
+              <a:schemeClr val="dk1"/>
             </a:fontRef>
           </p:style>
           <p:txBody>
@@ -24785,656 +24790,123 @@
             <a:lstStyle/>
             <a:p>
               <a:pPr algn="ctr"/>
+              <a:endParaRPr lang="en-US" dirty="0"/>
+            </a:p>
+          </p:txBody>
+        </p:sp>
+        <p:sp>
+          <p:nvSpPr>
+            <p:cNvPr id="41" name="ZoneTexte 40"/>
+            <p:cNvSpPr txBox="1"/>
+            <p:nvPr/>
+          </p:nvSpPr>
+          <p:spPr>
+            <a:xfrm>
+              <a:off x="1151748" y="4963920"/>
+              <a:ext cx="328958" cy="646331"/>
+            </a:xfrm>
+            <a:prstGeom prst="rect">
+              <a:avLst/>
+            </a:prstGeom>
+            <a:noFill/>
+          </p:spPr>
+          <p:txBody>
+            <a:bodyPr wrap="square" rtlCol="0">
+              <a:spAutoFit/>
+            </a:bodyPr>
+            <a:lstStyle/>
+            <a:p>
               <a:r>
-                <a:rPr lang="fr-FR" sz="3200" dirty="0"/>
-                <a:t>5</a:t>
+                <a:rPr lang="en-US" sz="3600" dirty="0"/>
+                <a:t>1</a:t>
               </a:r>
             </a:p>
           </p:txBody>
         </p:sp>
         <p:sp>
           <p:nvSpPr>
-            <p:cNvPr id="15" name="Flèche gauche 51"/>
-            <p:cNvSpPr/>
-            <p:nvPr/>
-          </p:nvSpPr>
-          <p:spPr>
-            <a:xfrm rot="3602346">
-              <a:off x="7668987" y="4826255"/>
-              <a:ext cx="731520" cy="313782"/>
-            </a:xfrm>
-            <a:prstGeom prst="leftArrow">
-              <a:avLst/>
-            </a:prstGeom>
-          </p:spPr>
-          <p:style>
-            <a:lnRef idx="2">
-              <a:schemeClr val="accent1">
-                <a:shade val="50000"/>
-              </a:schemeClr>
-            </a:lnRef>
-            <a:fillRef idx="1">
-              <a:schemeClr val="accent1"/>
-            </a:fillRef>
-            <a:effectRef idx="0">
-              <a:schemeClr val="accent1"/>
-            </a:effectRef>
-            <a:fontRef idx="minor">
-              <a:schemeClr val="lt1"/>
-            </a:fontRef>
-          </p:style>
-          <p:txBody>
-            <a:bodyPr rtlCol="0" anchor="ctr"/>
-            <a:lstStyle/>
-            <a:p>
-              <a:pPr algn="ctr"/>
-              <a:endParaRPr lang="fr-FR" dirty="0"/>
-            </a:p>
-          </p:txBody>
-        </p:sp>
-      </p:grpSp>
-      <p:grpSp>
-        <p:nvGrpSpPr>
-          <p:cNvPr id="16" name="Groupe 15"/>
-          <p:cNvGrpSpPr/>
-          <p:nvPr/>
-        </p:nvGrpSpPr>
-        <p:grpSpPr>
-          <a:xfrm>
-            <a:off x="6283164" y="2059578"/>
-            <a:ext cx="5345407" cy="3505877"/>
-            <a:chOff x="6283164" y="2059578"/>
-            <a:chExt cx="5345407" cy="3505877"/>
-          </a:xfrm>
-        </p:grpSpPr>
-        <p:sp>
-          <p:nvSpPr>
-            <p:cNvPr id="17" name="Ellipse 16"/>
-            <p:cNvSpPr/>
+            <p:cNvPr id="42" name="ZoneTexte 41"/>
+            <p:cNvSpPr txBox="1"/>
             <p:nvPr/>
           </p:nvSpPr>
           <p:spPr>
             <a:xfrm>
-              <a:off x="7884558" y="4937892"/>
-              <a:ext cx="631812" cy="627563"/>
+              <a:off x="2696014" y="5382367"/>
+              <a:ext cx="328958" cy="646331"/>
             </a:xfrm>
-            <a:prstGeom prst="ellipse">
+            <a:prstGeom prst="rect">
               <a:avLst/>
             </a:prstGeom>
-            <a:solidFill>
-              <a:srgbClr val="FF0000"/>
-            </a:solidFill>
-            <a:ln>
-              <a:solidFill>
-                <a:srgbClr val="FF0000"/>
-              </a:solidFill>
-            </a:ln>
+            <a:noFill/>
           </p:spPr>
-          <p:style>
-            <a:lnRef idx="2">
-              <a:schemeClr val="accent1">
-                <a:shade val="50000"/>
-              </a:schemeClr>
-            </a:lnRef>
-            <a:fillRef idx="1">
-              <a:schemeClr val="accent1"/>
-            </a:fillRef>
-            <a:effectRef idx="0">
-              <a:schemeClr val="accent1"/>
-            </a:effectRef>
-            <a:fontRef idx="minor">
-              <a:schemeClr val="lt1"/>
-            </a:fontRef>
-          </p:style>
           <p:txBody>
-            <a:bodyPr rtlCol="0" anchor="ctr"/>
+            <a:bodyPr wrap="square" rtlCol="0">
+              <a:spAutoFit/>
+            </a:bodyPr>
             <a:lstStyle/>
             <a:p>
-              <a:pPr algn="ctr"/>
               <a:r>
-                <a:rPr lang="fr-FR" sz="3200" dirty="0"/>
-                <a:t>5</a:t>
+                <a:rPr lang="en-US" sz="3600" dirty="0"/>
+                <a:t>2</a:t>
               </a:r>
-            </a:p>
-          </p:txBody>
-        </p:sp>
-        <p:cxnSp>
-          <p:nvCxnSpPr>
-            <p:cNvPr id="18" name="Connecteur droit avec flèche 17"/>
-            <p:cNvCxnSpPr/>
-            <p:nvPr/>
-          </p:nvCxnSpPr>
-          <p:spPr>
-            <a:xfrm>
-              <a:off x="7785784" y="4551617"/>
-              <a:ext cx="262181" cy="427605"/>
-            </a:xfrm>
-            <a:prstGeom prst="straightConnector1">
-              <a:avLst/>
-            </a:prstGeom>
-            <a:ln w="38100">
-              <a:solidFill>
-                <a:schemeClr val="accent1"/>
-              </a:solidFill>
-              <a:tailEnd type="triangle"/>
-            </a:ln>
-          </p:spPr>
-          <p:style>
-            <a:lnRef idx="1">
-              <a:schemeClr val="dk1"/>
-            </a:lnRef>
-            <a:fillRef idx="0">
-              <a:schemeClr val="dk1"/>
-            </a:fillRef>
-            <a:effectRef idx="0">
-              <a:schemeClr val="dk1"/>
-            </a:effectRef>
-            <a:fontRef idx="minor">
-              <a:schemeClr val="tx1"/>
-            </a:fontRef>
-          </p:style>
-        </p:cxnSp>
-        <p:grpSp>
-          <p:nvGrpSpPr>
-            <p:cNvPr id="19" name="Groupe 18"/>
-            <p:cNvGrpSpPr/>
-            <p:nvPr/>
-          </p:nvGrpSpPr>
-          <p:grpSpPr>
-            <a:xfrm>
-              <a:off x="9096292" y="2059578"/>
-              <a:ext cx="2532279" cy="2520329"/>
-              <a:chOff x="9096292" y="2059578"/>
-              <a:chExt cx="2532279" cy="2520329"/>
-            </a:xfrm>
-          </p:grpSpPr>
-          <p:sp>
-            <p:nvSpPr>
-              <p:cNvPr id="22" name="Ellipse 21"/>
-              <p:cNvSpPr/>
-              <p:nvPr/>
-            </p:nvSpPr>
-            <p:spPr>
-              <a:xfrm>
-                <a:off x="9729781" y="2059578"/>
-                <a:ext cx="631812" cy="627563"/>
-              </a:xfrm>
-              <a:prstGeom prst="ellipse">
-                <a:avLst/>
-              </a:prstGeom>
-              <a:solidFill>
-                <a:schemeClr val="tx1"/>
-              </a:solidFill>
-              <a:ln>
-                <a:solidFill>
-                  <a:schemeClr val="tx1"/>
-                </a:solidFill>
-              </a:ln>
-            </p:spPr>
-            <p:style>
-              <a:lnRef idx="2">
-                <a:schemeClr val="accent1">
-                  <a:shade val="50000"/>
-                </a:schemeClr>
-              </a:lnRef>
-              <a:fillRef idx="1">
-                <a:schemeClr val="accent1"/>
-              </a:fillRef>
-              <a:effectRef idx="0">
-                <a:schemeClr val="accent1"/>
-              </a:effectRef>
-              <a:fontRef idx="minor">
-                <a:schemeClr val="lt1"/>
-              </a:fontRef>
-            </p:style>
-            <p:txBody>
-              <a:bodyPr rtlCol="0" anchor="ctr"/>
-              <a:lstStyle/>
-              <a:p>
-                <a:pPr algn="ctr"/>
-                <a:r>
-                  <a:rPr lang="fr-FR" sz="3200" dirty="0"/>
-                  <a:t>2</a:t>
-                </a:r>
-              </a:p>
-            </p:txBody>
-          </p:sp>
-          <p:sp>
-            <p:nvSpPr>
-              <p:cNvPr id="23" name="Ellipse 22"/>
-              <p:cNvSpPr/>
-              <p:nvPr/>
-            </p:nvSpPr>
-            <p:spPr>
-              <a:xfrm>
-                <a:off x="9096292" y="3005961"/>
-                <a:ext cx="631812" cy="627563"/>
-              </a:xfrm>
-              <a:prstGeom prst="ellipse">
-                <a:avLst/>
-              </a:prstGeom>
-              <a:solidFill>
-                <a:schemeClr val="tx1"/>
-              </a:solidFill>
-              <a:ln>
-                <a:solidFill>
-                  <a:schemeClr val="tx1"/>
-                </a:solidFill>
-              </a:ln>
-            </p:spPr>
-            <p:style>
-              <a:lnRef idx="2">
-                <a:schemeClr val="accent1">
-                  <a:shade val="50000"/>
-                </a:schemeClr>
-              </a:lnRef>
-              <a:fillRef idx="1">
-                <a:schemeClr val="accent1"/>
-              </a:fillRef>
-              <a:effectRef idx="0">
-                <a:schemeClr val="accent1"/>
-              </a:effectRef>
-              <a:fontRef idx="minor">
-                <a:schemeClr val="lt1"/>
-              </a:fontRef>
-            </p:style>
-            <p:txBody>
-              <a:bodyPr rtlCol="0" anchor="ctr"/>
-              <a:lstStyle/>
-              <a:p>
-                <a:pPr algn="ctr"/>
-                <a:r>
-                  <a:rPr lang="fr-FR" sz="3200" dirty="0"/>
-                  <a:t>1</a:t>
-                </a:r>
-              </a:p>
-            </p:txBody>
-          </p:sp>
-          <p:sp>
-            <p:nvSpPr>
-              <p:cNvPr id="24" name="Ellipse 23"/>
-              <p:cNvSpPr/>
-              <p:nvPr/>
-            </p:nvSpPr>
-            <p:spPr>
-              <a:xfrm>
-                <a:off x="10363270" y="3005961"/>
-                <a:ext cx="631812" cy="627563"/>
-              </a:xfrm>
-              <a:prstGeom prst="ellipse">
-                <a:avLst/>
-              </a:prstGeom>
-              <a:solidFill>
-                <a:schemeClr val="tx1"/>
-              </a:solidFill>
-              <a:ln>
-                <a:solidFill>
-                  <a:schemeClr val="tx1"/>
-                </a:solidFill>
-              </a:ln>
-            </p:spPr>
-            <p:style>
-              <a:lnRef idx="2">
-                <a:schemeClr val="accent1">
-                  <a:shade val="50000"/>
-                </a:schemeClr>
-              </a:lnRef>
-              <a:fillRef idx="1">
-                <a:schemeClr val="accent1"/>
-              </a:fillRef>
-              <a:effectRef idx="0">
-                <a:schemeClr val="accent1"/>
-              </a:effectRef>
-              <a:fontRef idx="minor">
-                <a:schemeClr val="lt1"/>
-              </a:fontRef>
-            </p:style>
-            <p:txBody>
-              <a:bodyPr rtlCol="0" anchor="ctr"/>
-              <a:lstStyle/>
-              <a:p>
-                <a:pPr algn="ctr"/>
-                <a:r>
-                  <a:rPr lang="fr-FR" sz="3200" dirty="0"/>
-                  <a:t>4</a:t>
-                </a:r>
-              </a:p>
-            </p:txBody>
-          </p:sp>
-          <p:sp>
-            <p:nvSpPr>
-              <p:cNvPr id="25" name="Ellipse 24"/>
-              <p:cNvSpPr/>
-              <p:nvPr/>
-            </p:nvSpPr>
-            <p:spPr>
-              <a:xfrm>
-                <a:off x="10996759" y="3952344"/>
-                <a:ext cx="631812" cy="627563"/>
-              </a:xfrm>
-              <a:prstGeom prst="ellipse">
-                <a:avLst/>
-              </a:prstGeom>
-              <a:solidFill>
-                <a:srgbClr val="FF0000"/>
-              </a:solidFill>
-              <a:ln>
-                <a:solidFill>
-                  <a:srgbClr val="FF0000"/>
-                </a:solidFill>
-              </a:ln>
-            </p:spPr>
-            <p:style>
-              <a:lnRef idx="2">
-                <a:schemeClr val="accent1">
-                  <a:shade val="50000"/>
-                </a:schemeClr>
-              </a:lnRef>
-              <a:fillRef idx="1">
-                <a:schemeClr val="accent1"/>
-              </a:fillRef>
-              <a:effectRef idx="0">
-                <a:schemeClr val="accent1"/>
-              </a:effectRef>
-              <a:fontRef idx="minor">
-                <a:schemeClr val="lt1"/>
-              </a:fontRef>
-            </p:style>
-            <p:txBody>
-              <a:bodyPr rtlCol="0" anchor="ctr"/>
-              <a:lstStyle/>
-              <a:p>
-                <a:pPr algn="ctr"/>
-                <a:r>
-                  <a:rPr lang="fr-FR" sz="3200" dirty="0"/>
-                  <a:t>5</a:t>
-                </a:r>
-              </a:p>
-            </p:txBody>
-          </p:sp>
-          <p:cxnSp>
-            <p:nvCxnSpPr>
-              <p:cNvPr id="26" name="Connecteur droit avec flèche 25"/>
-              <p:cNvCxnSpPr/>
-              <p:nvPr/>
-            </p:nvCxnSpPr>
-            <p:spPr>
-              <a:xfrm>
-                <a:off x="10250314" y="2627012"/>
-                <a:ext cx="262181" cy="427605"/>
-              </a:xfrm>
-              <a:prstGeom prst="straightConnector1">
-                <a:avLst/>
-              </a:prstGeom>
-              <a:ln w="38100">
-                <a:solidFill>
-                  <a:schemeClr val="accent1"/>
-                </a:solidFill>
-                <a:tailEnd type="triangle"/>
-              </a:ln>
-            </p:spPr>
-            <p:style>
-              <a:lnRef idx="1">
-                <a:schemeClr val="dk1"/>
-              </a:lnRef>
-              <a:fillRef idx="0">
-                <a:schemeClr val="dk1"/>
-              </a:fillRef>
-              <a:effectRef idx="0">
-                <a:schemeClr val="dk1"/>
-              </a:effectRef>
-              <a:fontRef idx="minor">
-                <a:schemeClr val="tx1"/>
-              </a:fontRef>
-            </p:style>
-          </p:cxnSp>
-          <p:cxnSp>
-            <p:nvCxnSpPr>
-              <p:cNvPr id="27" name="Connecteur droit avec flèche 26"/>
-              <p:cNvCxnSpPr/>
-              <p:nvPr/>
-            </p:nvCxnSpPr>
-            <p:spPr>
-              <a:xfrm>
-                <a:off x="10863991" y="3598716"/>
-                <a:ext cx="262181" cy="427605"/>
-              </a:xfrm>
-              <a:prstGeom prst="straightConnector1">
-                <a:avLst/>
-              </a:prstGeom>
-              <a:ln w="38100">
-                <a:solidFill>
-                  <a:schemeClr val="accent1"/>
-                </a:solidFill>
-                <a:tailEnd type="triangle"/>
-              </a:ln>
-            </p:spPr>
-            <p:style>
-              <a:lnRef idx="1">
-                <a:schemeClr val="dk1"/>
-              </a:lnRef>
-              <a:fillRef idx="0">
-                <a:schemeClr val="dk1"/>
-              </a:fillRef>
-              <a:effectRef idx="0">
-                <a:schemeClr val="dk1"/>
-              </a:effectRef>
-              <a:fontRef idx="minor">
-                <a:schemeClr val="tx1"/>
-              </a:fontRef>
-            </p:style>
-          </p:cxnSp>
-          <p:cxnSp>
-            <p:nvCxnSpPr>
-              <p:cNvPr id="28" name="Connecteur droit avec flèche 27"/>
-              <p:cNvCxnSpPr/>
-              <p:nvPr/>
-            </p:nvCxnSpPr>
-            <p:spPr>
-              <a:xfrm flipH="1">
-                <a:off x="9595937" y="2627011"/>
-                <a:ext cx="262181" cy="427605"/>
-              </a:xfrm>
-              <a:prstGeom prst="straightConnector1">
-                <a:avLst/>
-              </a:prstGeom>
-              <a:ln w="38100">
-                <a:solidFill>
-                  <a:srgbClr val="FF0000"/>
-                </a:solidFill>
-                <a:tailEnd type="triangle"/>
-              </a:ln>
-            </p:spPr>
-            <p:style>
-              <a:lnRef idx="1">
-                <a:schemeClr val="dk1"/>
-              </a:lnRef>
-              <a:fillRef idx="0">
-                <a:schemeClr val="dk1"/>
-              </a:fillRef>
-              <a:effectRef idx="0">
-                <a:schemeClr val="dk1"/>
-              </a:effectRef>
-              <a:fontRef idx="minor">
-                <a:schemeClr val="tx1"/>
-              </a:fontRef>
-            </p:style>
-          </p:cxnSp>
-          <p:sp>
-            <p:nvSpPr>
-              <p:cNvPr id="29" name="Ellipse 28"/>
-              <p:cNvSpPr/>
-              <p:nvPr/>
-            </p:nvSpPr>
-            <p:spPr>
-              <a:xfrm>
-                <a:off x="9763774" y="3952344"/>
-                <a:ext cx="631812" cy="627563"/>
-              </a:xfrm>
-              <a:prstGeom prst="ellipse">
-                <a:avLst/>
-              </a:prstGeom>
-              <a:solidFill>
-                <a:srgbClr val="FF0000"/>
-              </a:solidFill>
-              <a:ln>
-                <a:solidFill>
-                  <a:srgbClr val="FF0000"/>
-                </a:solidFill>
-              </a:ln>
-            </p:spPr>
-            <p:style>
-              <a:lnRef idx="2">
-                <a:schemeClr val="accent1">
-                  <a:shade val="50000"/>
-                </a:schemeClr>
-              </a:lnRef>
-              <a:fillRef idx="1">
-                <a:schemeClr val="accent1"/>
-              </a:fillRef>
-              <a:effectRef idx="0">
-                <a:schemeClr val="accent1"/>
-              </a:effectRef>
-              <a:fontRef idx="minor">
-                <a:schemeClr val="lt1"/>
-              </a:fontRef>
-            </p:style>
-            <p:txBody>
-              <a:bodyPr rtlCol="0" anchor="ctr"/>
-              <a:lstStyle/>
-              <a:p>
-                <a:pPr algn="ctr"/>
-                <a:r>
-                  <a:rPr lang="fr-FR" sz="3200" dirty="0"/>
-                  <a:t>3</a:t>
-                </a:r>
-              </a:p>
-            </p:txBody>
-          </p:sp>
-          <p:cxnSp>
-            <p:nvCxnSpPr>
-              <p:cNvPr id="32" name="Connecteur droit avec flèche 31"/>
-              <p:cNvCxnSpPr/>
-              <p:nvPr/>
-            </p:nvCxnSpPr>
-            <p:spPr>
-              <a:xfrm flipH="1">
-                <a:off x="10263419" y="3573394"/>
-                <a:ext cx="262181" cy="427605"/>
-              </a:xfrm>
-              <a:prstGeom prst="straightConnector1">
-                <a:avLst/>
-              </a:prstGeom>
-              <a:ln w="38100">
-                <a:solidFill>
-                  <a:srgbClr val="FF0000"/>
-                </a:solidFill>
-                <a:tailEnd type="triangle"/>
-              </a:ln>
-            </p:spPr>
-            <p:style>
-              <a:lnRef idx="1">
-                <a:schemeClr val="dk1"/>
-              </a:lnRef>
-              <a:fillRef idx="0">
-                <a:schemeClr val="dk1"/>
-              </a:fillRef>
-              <a:effectRef idx="0">
-                <a:schemeClr val="dk1"/>
-              </a:effectRef>
-              <a:fontRef idx="minor">
-                <a:schemeClr val="tx1"/>
-              </a:fontRef>
-            </p:style>
-          </p:cxnSp>
-        </p:grpSp>
-        <p:sp>
-          <p:nvSpPr>
-            <p:cNvPr id="20" name="Flèche droite 49"/>
-            <p:cNvSpPr/>
-            <p:nvPr/>
-          </p:nvSpPr>
-          <p:spPr>
-            <a:xfrm>
-              <a:off x="8047965" y="3239589"/>
-              <a:ext cx="730275" cy="393935"/>
-            </a:xfrm>
-            <a:prstGeom prst="rightArrow">
-              <a:avLst/>
-            </a:prstGeom>
-          </p:spPr>
-          <p:style>
-            <a:lnRef idx="2">
-              <a:schemeClr val="accent1">
-                <a:shade val="50000"/>
-              </a:schemeClr>
-            </a:lnRef>
-            <a:fillRef idx="1">
-              <a:schemeClr val="accent1"/>
-            </a:fillRef>
-            <a:effectRef idx="0">
-              <a:schemeClr val="accent1"/>
-            </a:effectRef>
-            <a:fontRef idx="minor">
-              <a:schemeClr val="lt1"/>
-            </a:fontRef>
-          </p:style>
-          <p:txBody>
-            <a:bodyPr rtlCol="0" anchor="ctr"/>
-            <a:lstStyle/>
-            <a:p>
-              <a:pPr algn="ctr"/>
-              <a:endParaRPr lang="fr-FR"/>
             </a:p>
           </p:txBody>
         </p:sp>
         <p:sp>
           <p:nvSpPr>
-            <p:cNvPr id="21" name="Flèche en arc 9"/>
-            <p:cNvSpPr/>
+            <p:cNvPr id="43" name="ZoneTexte 42"/>
+            <p:cNvSpPr txBox="1"/>
             <p:nvPr/>
           </p:nvSpPr>
           <p:spPr>
-            <a:xfrm rot="19194999" flipH="1">
-              <a:off x="6283164" y="2520943"/>
-              <a:ext cx="1416858" cy="1597596"/>
+            <a:xfrm>
+              <a:off x="1623560" y="5541281"/>
+              <a:ext cx="328958" cy="646331"/>
             </a:xfrm>
-            <a:prstGeom prst="circularArrow">
-              <a:avLst>
-                <a:gd name="adj1" fmla="val 1633"/>
-                <a:gd name="adj2" fmla="val 1142319"/>
-                <a:gd name="adj3" fmla="val 20590268"/>
-                <a:gd name="adj4" fmla="val 5656747"/>
-                <a:gd name="adj5" fmla="val 7717"/>
-              </a:avLst>
+            <a:prstGeom prst="rect">
+              <a:avLst/>
             </a:prstGeom>
+            <a:noFill/>
           </p:spPr>
-          <p:style>
-            <a:lnRef idx="2">
-              <a:schemeClr val="accent3">
-                <a:shade val="50000"/>
-              </a:schemeClr>
-            </a:lnRef>
-            <a:fillRef idx="1">
-              <a:schemeClr val="accent3"/>
-            </a:fillRef>
-            <a:effectRef idx="0">
-              <a:schemeClr val="accent3"/>
-            </a:effectRef>
-            <a:fontRef idx="minor">
-              <a:schemeClr val="lt1"/>
-            </a:fontRef>
-          </p:style>
           <p:txBody>
-            <a:bodyPr rtlCol="0" anchor="ctr"/>
+            <a:bodyPr wrap="square" rtlCol="0">
+              <a:spAutoFit/>
+            </a:bodyPr>
             <a:lstStyle/>
             <a:p>
-              <a:pPr algn="ctr"/>
-              <a:endParaRPr lang="fr-FR">
-                <a:solidFill>
-                  <a:schemeClr val="tx1"/>
-                </a:solidFill>
-              </a:endParaRPr>
+              <a:r>
+                <a:rPr lang="en-US" sz="3600" dirty="0"/>
+                <a:t>3</a:t>
+              </a:r>
+            </a:p>
+          </p:txBody>
+        </p:sp>
+        <p:sp>
+          <p:nvSpPr>
+            <p:cNvPr id="44" name="ZoneTexte 43"/>
+            <p:cNvSpPr txBox="1"/>
+            <p:nvPr/>
+          </p:nvSpPr>
+          <p:spPr>
+            <a:xfrm>
+              <a:off x="532460" y="5329709"/>
+              <a:ext cx="328958" cy="646331"/>
+            </a:xfrm>
+            <a:prstGeom prst="rect">
+              <a:avLst/>
+            </a:prstGeom>
+            <a:noFill/>
+          </p:spPr>
+          <p:txBody>
+            <a:bodyPr wrap="square" rtlCol="0">
+              <a:spAutoFit/>
+            </a:bodyPr>
+            <a:lstStyle/>
+            <a:p>
+              <a:r>
+                <a:rPr lang="en-US" sz="3600" dirty="0"/>
+                <a:t>4</a:t>
+              </a:r>
             </a:p>
           </p:txBody>
         </p:sp>
@@ -25449,153 +24921,6 @@
   <p:clrMapOvr>
     <a:masterClrMapping/>
   </p:clrMapOvr>
-  <p:timing>
-    <p:tnLst>
-      <p:par>
-        <p:cTn id="1" dur="indefinite" restart="never" nodeType="tmRoot">
-          <p:childTnLst>
-            <p:seq concurrent="1" nextAc="seek">
-              <p:cTn id="2" dur="indefinite" nodeType="mainSeq">
-                <p:childTnLst>
-                  <p:par>
-                    <p:cTn id="3" fill="hold">
-                      <p:stCondLst>
-                        <p:cond delay="indefinite"/>
-                      </p:stCondLst>
-                      <p:childTnLst>
-                        <p:par>
-                          <p:cTn id="4" fill="hold">
-                            <p:stCondLst>
-                              <p:cond delay="0"/>
-                            </p:stCondLst>
-                            <p:childTnLst>
-                              <p:par>
-                                <p:cTn id="5" presetID="1" presetClass="entr" presetSubtype="0" fill="hold" nodeType="clickEffect">
-                                  <p:stCondLst>
-                                    <p:cond delay="0"/>
-                                  </p:stCondLst>
-                                  <p:childTnLst>
-                                    <p:set>
-                                      <p:cBhvr>
-                                        <p:cTn id="6" dur="1" fill="hold">
-                                          <p:stCondLst>
-                                            <p:cond delay="0"/>
-                                          </p:stCondLst>
-                                        </p:cTn>
-                                        <p:tgtEl>
-                                          <p:spTgt spid="13"/>
-                                        </p:tgtEl>
-                                        <p:attrNameLst>
-                                          <p:attrName>style.visibility</p:attrName>
-                                        </p:attrNameLst>
-                                      </p:cBhvr>
-                                      <p:to>
-                                        <p:strVal val="visible"/>
-                                      </p:to>
-                                    </p:set>
-                                  </p:childTnLst>
-                                </p:cTn>
-                              </p:par>
-                            </p:childTnLst>
-                          </p:cTn>
-                        </p:par>
-                      </p:childTnLst>
-                    </p:cTn>
-                  </p:par>
-                  <p:par>
-                    <p:cTn id="7" fill="hold">
-                      <p:stCondLst>
-                        <p:cond delay="indefinite"/>
-                      </p:stCondLst>
-                      <p:childTnLst>
-                        <p:par>
-                          <p:cTn id="8" fill="hold">
-                            <p:stCondLst>
-                              <p:cond delay="0"/>
-                            </p:stCondLst>
-                            <p:childTnLst>
-                              <p:par>
-                                <p:cTn id="9" presetID="1" presetClass="entr" presetSubtype="0" fill="hold" nodeType="clickEffect">
-                                  <p:stCondLst>
-                                    <p:cond delay="0"/>
-                                  </p:stCondLst>
-                                  <p:childTnLst>
-                                    <p:set>
-                                      <p:cBhvr>
-                                        <p:cTn id="10" dur="1" fill="hold">
-                                          <p:stCondLst>
-                                            <p:cond delay="0"/>
-                                          </p:stCondLst>
-                                        </p:cTn>
-                                        <p:tgtEl>
-                                          <p:spTgt spid="16"/>
-                                        </p:tgtEl>
-                                        <p:attrNameLst>
-                                          <p:attrName>style.visibility</p:attrName>
-                                        </p:attrNameLst>
-                                      </p:cBhvr>
-                                      <p:to>
-                                        <p:strVal val="visible"/>
-                                      </p:to>
-                                    </p:set>
-                                  </p:childTnLst>
-                                </p:cTn>
-                              </p:par>
-                              <p:par>
-                                <p:cTn id="11" presetID="1" presetClass="exit" presetSubtype="0" fill="hold" nodeType="withEffect">
-                                  <p:stCondLst>
-                                    <p:cond delay="0"/>
-                                  </p:stCondLst>
-                                  <p:childTnLst>
-                                    <p:set>
-                                      <p:cBhvr>
-                                        <p:cTn id="12" dur="1" fill="hold">
-                                          <p:stCondLst>
-                                            <p:cond delay="0"/>
-                                          </p:stCondLst>
-                                        </p:cTn>
-                                        <p:tgtEl>
-                                          <p:spTgt spid="13"/>
-                                        </p:tgtEl>
-                                        <p:attrNameLst>
-                                          <p:attrName>style.visibility</p:attrName>
-                                        </p:attrNameLst>
-                                      </p:cBhvr>
-                                      <p:to>
-                                        <p:strVal val="hidden"/>
-                                      </p:to>
-                                    </p:set>
-                                  </p:childTnLst>
-                                </p:cTn>
-                              </p:par>
-                            </p:childTnLst>
-                          </p:cTn>
-                        </p:par>
-                      </p:childTnLst>
-                    </p:cTn>
-                  </p:par>
-                </p:childTnLst>
-              </p:cTn>
-              <p:prevCondLst>
-                <p:cond evt="onPrev" delay="0">
-                  <p:tgtEl>
-                    <p:sldTgt/>
-                  </p:tgtEl>
-                </p:cond>
-              </p:prevCondLst>
-              <p:nextCondLst>
-                <p:cond evt="onNext" delay="0">
-                  <p:tgtEl>
-                    <p:sldTgt/>
-                  </p:tgtEl>
-                </p:cond>
-              </p:nextCondLst>
-            </p:seq>
-          </p:childTnLst>
-        </p:cTn>
-      </p:par>
-    </p:tnLst>
-  </p:timing>
 </p:sld>
 </file>
 
@@ -25907,7 +25232,7 @@
               </a:pPr>
               <a:r>
                 <a:rPr lang="en-US" sz="3200" dirty="0"/>
-                <a:t>Self-balancing</a:t>
+                <a:t>Balancing</a:t>
               </a:r>
             </a:p>
           </p:txBody>
@@ -27645,7 +26970,7 @@
             </a:pPr>
             <a:r>
               <a:rPr lang="en-US" sz="3200" dirty="0"/>
-              <a:t>self balancing</a:t>
+              <a:t>balancing</a:t>
             </a:r>
           </a:p>
         </p:txBody>
@@ -29237,13 +28562,13 @@
           <p:nvPr>
             <p:extLst>
               <p:ext uri="{D42A27DB-BD31-4B8C-83A1-F6EECF244321}">
-                <p14:modId xmlns:p14="http://schemas.microsoft.com/office/powerpoint/2010/main" val="741802275"/>
+                <p14:modId xmlns:p14="http://schemas.microsoft.com/office/powerpoint/2010/main" val="797598836"/>
               </p:ext>
             </p:extLst>
           </p:nvPr>
         </p:nvGraphicFramePr>
         <p:xfrm>
-          <a:off x="1246865" y="2110006"/>
+          <a:off x="3682290" y="4692617"/>
           <a:ext cx="5202582" cy="907523"/>
         </p:xfrm>
         <a:graphic>
@@ -29421,7 +28746,7 @@
         </p:nvSpPr>
         <p:spPr>
           <a:xfrm rot="327104">
-            <a:off x="3524690" y="1524219"/>
+            <a:off x="5960115" y="4106830"/>
             <a:ext cx="1770412" cy="1147639"/>
           </a:xfrm>
           <a:prstGeom prst="circularArrow">
@@ -29476,7 +28801,7 @@
         </p:nvSpPr>
         <p:spPr>
           <a:xfrm flipV="1">
-            <a:off x="5224944" y="2480964"/>
+            <a:off x="7660369" y="5063575"/>
             <a:ext cx="888274" cy="1098426"/>
           </a:xfrm>
           <a:prstGeom prst="circularArrow">
@@ -29531,7 +28856,7 @@
         </p:nvSpPr>
         <p:spPr>
           <a:xfrm rot="327104" flipH="1" flipV="1">
-            <a:off x="2446017" y="2466413"/>
+            <a:off x="4881442" y="5049024"/>
             <a:ext cx="2698024" cy="1147639"/>
           </a:xfrm>
           <a:prstGeom prst="circularArrow">
@@ -29589,7 +28914,7 @@
         </p:nvSpPr>
         <p:spPr>
           <a:xfrm rot="21272896" flipH="1">
-            <a:off x="1559704" y="1524220"/>
+            <a:off x="3995129" y="4106831"/>
             <a:ext cx="1770412" cy="1147639"/>
           </a:xfrm>
           <a:prstGeom prst="circularArrow">
@@ -29827,7 +29152,7 @@
           <a:p>
             <a:r>
               <a:rPr lang="en-US" sz="3200" dirty="0"/>
-              <a:t>No values or colors</a:t>
+              <a:t>No value or color</a:t>
             </a:r>
           </a:p>
           <a:p>
@@ -29838,364 +29163,6 @@
           </a:p>
         </p:txBody>
       </p:sp>
-      <p:grpSp>
-        <p:nvGrpSpPr>
-          <p:cNvPr id="9" name="Groupe 8"/>
-          <p:cNvGrpSpPr/>
-          <p:nvPr/>
-        </p:nvGrpSpPr>
-        <p:grpSpPr>
-          <a:xfrm>
-            <a:off x="8107313" y="3727700"/>
-            <a:ext cx="2857001" cy="2947074"/>
-            <a:chOff x="9096292" y="2059578"/>
-            <a:chExt cx="2532279" cy="2520329"/>
-          </a:xfrm>
-        </p:grpSpPr>
-        <p:sp>
-          <p:nvSpPr>
-            <p:cNvPr id="10" name="Ellipse 9"/>
-            <p:cNvSpPr/>
-            <p:nvPr/>
-          </p:nvSpPr>
-          <p:spPr>
-            <a:xfrm>
-              <a:off x="9729781" y="2059578"/>
-              <a:ext cx="631812" cy="627563"/>
-            </a:xfrm>
-            <a:prstGeom prst="ellipse">
-              <a:avLst/>
-            </a:prstGeom>
-            <a:ln w="28575">
-              <a:solidFill>
-                <a:schemeClr val="tx1"/>
-              </a:solidFill>
-            </a:ln>
-          </p:spPr>
-          <p:style>
-            <a:lnRef idx="2">
-              <a:schemeClr val="dk1"/>
-            </a:lnRef>
-            <a:fillRef idx="1">
-              <a:schemeClr val="lt1"/>
-            </a:fillRef>
-            <a:effectRef idx="0">
-              <a:schemeClr val="dk1"/>
-            </a:effectRef>
-            <a:fontRef idx="minor">
-              <a:schemeClr val="dk1"/>
-            </a:fontRef>
-          </p:style>
-          <p:txBody>
-            <a:bodyPr rtlCol="0" anchor="ctr"/>
-            <a:lstStyle/>
-            <a:p>
-              <a:pPr algn="ctr"/>
-              <a:endParaRPr lang="en-US" sz="2400" dirty="0"/>
-            </a:p>
-          </p:txBody>
-        </p:sp>
-        <p:sp>
-          <p:nvSpPr>
-            <p:cNvPr id="11" name="Ellipse 10"/>
-            <p:cNvSpPr/>
-            <p:nvPr/>
-          </p:nvSpPr>
-          <p:spPr>
-            <a:xfrm>
-              <a:off x="9096292" y="3005961"/>
-              <a:ext cx="631812" cy="627563"/>
-            </a:xfrm>
-            <a:prstGeom prst="ellipse">
-              <a:avLst/>
-            </a:prstGeom>
-            <a:ln w="28575"/>
-          </p:spPr>
-          <p:style>
-            <a:lnRef idx="2">
-              <a:schemeClr val="dk1"/>
-            </a:lnRef>
-            <a:fillRef idx="1">
-              <a:schemeClr val="lt1"/>
-            </a:fillRef>
-            <a:effectRef idx="0">
-              <a:schemeClr val="dk1"/>
-            </a:effectRef>
-            <a:fontRef idx="minor">
-              <a:schemeClr val="dk1"/>
-            </a:fontRef>
-          </p:style>
-          <p:txBody>
-            <a:bodyPr rtlCol="0" anchor="ctr"/>
-            <a:lstStyle/>
-            <a:p>
-              <a:pPr algn="ctr"/>
-              <a:endParaRPr lang="en-US" sz="2400" dirty="0"/>
-            </a:p>
-          </p:txBody>
-        </p:sp>
-        <p:sp>
-          <p:nvSpPr>
-            <p:cNvPr id="12" name="Ellipse 11"/>
-            <p:cNvSpPr/>
-            <p:nvPr/>
-          </p:nvSpPr>
-          <p:spPr>
-            <a:xfrm>
-              <a:off x="10363270" y="3005961"/>
-              <a:ext cx="631812" cy="627563"/>
-            </a:xfrm>
-            <a:prstGeom prst="ellipse">
-              <a:avLst/>
-            </a:prstGeom>
-            <a:ln w="28575"/>
-          </p:spPr>
-          <p:style>
-            <a:lnRef idx="2">
-              <a:schemeClr val="dk1"/>
-            </a:lnRef>
-            <a:fillRef idx="1">
-              <a:schemeClr val="lt1"/>
-            </a:fillRef>
-            <a:effectRef idx="0">
-              <a:schemeClr val="dk1"/>
-            </a:effectRef>
-            <a:fontRef idx="minor">
-              <a:schemeClr val="dk1"/>
-            </a:fontRef>
-          </p:style>
-          <p:txBody>
-            <a:bodyPr rtlCol="0" anchor="ctr"/>
-            <a:lstStyle/>
-            <a:p>
-              <a:pPr algn="ctr"/>
-              <a:endParaRPr lang="en-US" sz="2400" dirty="0"/>
-            </a:p>
-          </p:txBody>
-        </p:sp>
-        <p:sp>
-          <p:nvSpPr>
-            <p:cNvPr id="13" name="Ellipse 12"/>
-            <p:cNvSpPr/>
-            <p:nvPr/>
-          </p:nvSpPr>
-          <p:spPr>
-            <a:xfrm>
-              <a:off x="10996759" y="3952344"/>
-              <a:ext cx="631812" cy="627563"/>
-            </a:xfrm>
-            <a:prstGeom prst="ellipse">
-              <a:avLst/>
-            </a:prstGeom>
-            <a:ln w="28575"/>
-          </p:spPr>
-          <p:style>
-            <a:lnRef idx="2">
-              <a:schemeClr val="dk1"/>
-            </a:lnRef>
-            <a:fillRef idx="1">
-              <a:schemeClr val="lt1"/>
-            </a:fillRef>
-            <a:effectRef idx="0">
-              <a:schemeClr val="dk1"/>
-            </a:effectRef>
-            <a:fontRef idx="minor">
-              <a:schemeClr val="dk1"/>
-            </a:fontRef>
-          </p:style>
-          <p:txBody>
-            <a:bodyPr rtlCol="0" anchor="ctr"/>
-            <a:lstStyle/>
-            <a:p>
-              <a:pPr algn="ctr"/>
-              <a:endParaRPr lang="en-US" sz="2400" dirty="0"/>
-            </a:p>
-          </p:txBody>
-        </p:sp>
-        <p:cxnSp>
-          <p:nvCxnSpPr>
-            <p:cNvPr id="14" name="Connecteur droit avec flèche 13"/>
-            <p:cNvCxnSpPr/>
-            <p:nvPr/>
-          </p:nvCxnSpPr>
-          <p:spPr>
-            <a:xfrm>
-              <a:off x="10250314" y="2627012"/>
-              <a:ext cx="262181" cy="427605"/>
-            </a:xfrm>
-            <a:prstGeom prst="straightConnector1">
-              <a:avLst/>
-            </a:prstGeom>
-            <a:ln w="38100">
-              <a:solidFill>
-                <a:schemeClr val="accent1"/>
-              </a:solidFill>
-              <a:tailEnd type="triangle"/>
-            </a:ln>
-          </p:spPr>
-          <p:style>
-            <a:lnRef idx="1">
-              <a:schemeClr val="dk1"/>
-            </a:lnRef>
-            <a:fillRef idx="0">
-              <a:schemeClr val="dk1"/>
-            </a:fillRef>
-            <a:effectRef idx="0">
-              <a:schemeClr val="dk1"/>
-            </a:effectRef>
-            <a:fontRef idx="minor">
-              <a:schemeClr val="tx1"/>
-            </a:fontRef>
-          </p:style>
-        </p:cxnSp>
-        <p:cxnSp>
-          <p:nvCxnSpPr>
-            <p:cNvPr id="15" name="Connecteur droit avec flèche 14"/>
-            <p:cNvCxnSpPr/>
-            <p:nvPr/>
-          </p:nvCxnSpPr>
-          <p:spPr>
-            <a:xfrm>
-              <a:off x="10863991" y="3598716"/>
-              <a:ext cx="262181" cy="427605"/>
-            </a:xfrm>
-            <a:prstGeom prst="straightConnector1">
-              <a:avLst/>
-            </a:prstGeom>
-            <a:ln w="38100">
-              <a:solidFill>
-                <a:schemeClr val="accent1"/>
-              </a:solidFill>
-              <a:tailEnd type="triangle"/>
-            </a:ln>
-          </p:spPr>
-          <p:style>
-            <a:lnRef idx="1">
-              <a:schemeClr val="dk1"/>
-            </a:lnRef>
-            <a:fillRef idx="0">
-              <a:schemeClr val="dk1"/>
-            </a:fillRef>
-            <a:effectRef idx="0">
-              <a:schemeClr val="dk1"/>
-            </a:effectRef>
-            <a:fontRef idx="minor">
-              <a:schemeClr val="tx1"/>
-            </a:fontRef>
-          </p:style>
-        </p:cxnSp>
-        <p:cxnSp>
-          <p:nvCxnSpPr>
-            <p:cNvPr id="16" name="Connecteur droit avec flèche 15"/>
-            <p:cNvCxnSpPr/>
-            <p:nvPr/>
-          </p:nvCxnSpPr>
-          <p:spPr>
-            <a:xfrm flipH="1">
-              <a:off x="9595937" y="2627011"/>
-              <a:ext cx="262181" cy="427605"/>
-            </a:xfrm>
-            <a:prstGeom prst="straightConnector1">
-              <a:avLst/>
-            </a:prstGeom>
-            <a:ln w="38100">
-              <a:solidFill>
-                <a:srgbClr val="FF0000"/>
-              </a:solidFill>
-              <a:tailEnd type="triangle"/>
-            </a:ln>
-          </p:spPr>
-          <p:style>
-            <a:lnRef idx="1">
-              <a:schemeClr val="dk1"/>
-            </a:lnRef>
-            <a:fillRef idx="0">
-              <a:schemeClr val="dk1"/>
-            </a:fillRef>
-            <a:effectRef idx="0">
-              <a:schemeClr val="dk1"/>
-            </a:effectRef>
-            <a:fontRef idx="minor">
-              <a:schemeClr val="tx1"/>
-            </a:fontRef>
-          </p:style>
-        </p:cxnSp>
-        <p:sp>
-          <p:nvSpPr>
-            <p:cNvPr id="17" name="Ellipse 16"/>
-            <p:cNvSpPr/>
-            <p:nvPr/>
-          </p:nvSpPr>
-          <p:spPr>
-            <a:xfrm>
-              <a:off x="9763774" y="3952344"/>
-              <a:ext cx="631812" cy="627563"/>
-            </a:xfrm>
-            <a:prstGeom prst="ellipse">
-              <a:avLst/>
-            </a:prstGeom>
-            <a:ln w="28575"/>
-          </p:spPr>
-          <p:style>
-            <a:lnRef idx="2">
-              <a:schemeClr val="dk1"/>
-            </a:lnRef>
-            <a:fillRef idx="1">
-              <a:schemeClr val="lt1"/>
-            </a:fillRef>
-            <a:effectRef idx="0">
-              <a:schemeClr val="dk1"/>
-            </a:effectRef>
-            <a:fontRef idx="minor">
-              <a:schemeClr val="dk1"/>
-            </a:fontRef>
-          </p:style>
-          <p:txBody>
-            <a:bodyPr rtlCol="0" anchor="ctr"/>
-            <a:lstStyle/>
-            <a:p>
-              <a:pPr algn="ctr"/>
-              <a:endParaRPr lang="en-US" sz="2400" dirty="0"/>
-            </a:p>
-          </p:txBody>
-        </p:sp>
-        <p:cxnSp>
-          <p:nvCxnSpPr>
-            <p:cNvPr id="18" name="Connecteur droit avec flèche 17"/>
-            <p:cNvCxnSpPr/>
-            <p:nvPr/>
-          </p:nvCxnSpPr>
-          <p:spPr>
-            <a:xfrm flipH="1">
-              <a:off x="10263419" y="3573394"/>
-              <a:ext cx="262181" cy="427605"/>
-            </a:xfrm>
-            <a:prstGeom prst="straightConnector1">
-              <a:avLst/>
-            </a:prstGeom>
-            <a:ln w="38100">
-              <a:solidFill>
-                <a:srgbClr val="FF0000"/>
-              </a:solidFill>
-              <a:tailEnd type="triangle"/>
-            </a:ln>
-          </p:spPr>
-          <p:style>
-            <a:lnRef idx="1">
-              <a:schemeClr val="dk1"/>
-            </a:lnRef>
-            <a:fillRef idx="0">
-              <a:schemeClr val="dk1"/>
-            </a:fillRef>
-            <a:effectRef idx="0">
-              <a:schemeClr val="dk1"/>
-            </a:effectRef>
-            <a:fontRef idx="minor">
-              <a:schemeClr val="tx1"/>
-            </a:fontRef>
-          </p:style>
-        </p:cxnSp>
-      </p:grpSp>
       <p:grpSp>
         <p:nvGrpSpPr>
           <p:cNvPr id="20" name="Groupe 19"/>
@@ -30204,7 +29171,7 @@
         </p:nvGrpSpPr>
         <p:grpSpPr>
           <a:xfrm>
-            <a:off x="3233733" y="2382393"/>
+            <a:off x="5669158" y="4965004"/>
             <a:ext cx="371982" cy="355257"/>
             <a:chOff x="5830615" y="1385726"/>
             <a:chExt cx="371982" cy="355257"/>
@@ -30364,174 +29331,6 @@
           </p:sp>
         </p:grpSp>
       </p:grpSp>
-      <p:grpSp>
-        <p:nvGrpSpPr>
-          <p:cNvPr id="41" name="Groupe 40"/>
-          <p:cNvGrpSpPr/>
-          <p:nvPr/>
-        </p:nvGrpSpPr>
-        <p:grpSpPr>
-          <a:xfrm>
-            <a:off x="8992460" y="3915936"/>
-            <a:ext cx="371982" cy="355257"/>
-            <a:chOff x="5830615" y="1385726"/>
-            <a:chExt cx="371982" cy="355257"/>
-          </a:xfrm>
-        </p:grpSpPr>
-        <p:sp>
-          <p:nvSpPr>
-            <p:cNvPr id="42" name="Ellipse 41"/>
-            <p:cNvSpPr/>
-            <p:nvPr/>
-          </p:nvSpPr>
-          <p:spPr>
-            <a:xfrm>
-              <a:off x="5830615" y="1385726"/>
-              <a:ext cx="371982" cy="355257"/>
-            </a:xfrm>
-            <a:prstGeom prst="ellipse">
-              <a:avLst/>
-            </a:prstGeom>
-          </p:spPr>
-          <p:style>
-            <a:lnRef idx="1">
-              <a:schemeClr val="accent2"/>
-            </a:lnRef>
-            <a:fillRef idx="3">
-              <a:schemeClr val="accent2"/>
-            </a:fillRef>
-            <a:effectRef idx="2">
-              <a:schemeClr val="accent2"/>
-            </a:effectRef>
-            <a:fontRef idx="minor">
-              <a:schemeClr val="lt1"/>
-            </a:fontRef>
-          </p:style>
-          <p:txBody>
-            <a:bodyPr rtlCol="0" anchor="ctr"/>
-            <a:lstStyle/>
-            <a:p>
-              <a:pPr algn="ctr"/>
-              <a:endParaRPr lang="en-US">
-                <a:ln w="0"/>
-                <a:solidFill>
-                  <a:schemeClr val="tx1"/>
-                </a:solidFill>
-                <a:effectLst>
-                  <a:outerShdw blurRad="38100" dist="19050" dir="2700000" algn="tl" rotWithShape="0">
-                    <a:schemeClr val="dk1">
-                      <a:alpha val="40000"/>
-                    </a:schemeClr>
-                  </a:outerShdw>
-                </a:effectLst>
-              </a:endParaRPr>
-            </a:p>
-          </p:txBody>
-        </p:sp>
-        <p:grpSp>
-          <p:nvGrpSpPr>
-            <p:cNvPr id="43" name="Groupe 42"/>
-            <p:cNvGrpSpPr/>
-            <p:nvPr/>
-          </p:nvGrpSpPr>
-          <p:grpSpPr>
-            <a:xfrm>
-              <a:off x="5910825" y="1471491"/>
-              <a:ext cx="211562" cy="215849"/>
-              <a:chOff x="4164368" y="630536"/>
-              <a:chExt cx="641995" cy="641995"/>
-            </a:xfrm>
-          </p:grpSpPr>
-          <p:sp>
-            <p:nvSpPr>
-              <p:cNvPr id="44" name="Rectangle 43"/>
-              <p:cNvSpPr/>
-              <p:nvPr/>
-            </p:nvSpPr>
-            <p:spPr>
-              <a:xfrm>
-                <a:off x="4164368" y="630536"/>
-                <a:ext cx="641995" cy="203182"/>
-              </a:xfrm>
-              <a:prstGeom prst="rect">
-                <a:avLst/>
-              </a:prstGeom>
-              <a:solidFill>
-                <a:schemeClr val="bg1"/>
-              </a:solidFill>
-              <a:ln>
-                <a:noFill/>
-              </a:ln>
-            </p:spPr>
-            <p:style>
-              <a:lnRef idx="3">
-                <a:schemeClr val="lt1"/>
-              </a:lnRef>
-              <a:fillRef idx="1">
-                <a:schemeClr val="dk1"/>
-              </a:fillRef>
-              <a:effectRef idx="1">
-                <a:schemeClr val="dk1"/>
-              </a:effectRef>
-              <a:fontRef idx="minor">
-                <a:schemeClr val="lt1"/>
-              </a:fontRef>
-            </p:style>
-            <p:txBody>
-              <a:bodyPr rtlCol="0" anchor="ctr"/>
-              <a:lstStyle/>
-              <a:p>
-                <a:pPr algn="ctr"/>
-                <a:endParaRPr lang="en-US"/>
-              </a:p>
-            </p:txBody>
-          </p:sp>
-          <p:sp>
-            <p:nvSpPr>
-              <p:cNvPr id="45" name="Rectangle 44"/>
-              <p:cNvSpPr/>
-              <p:nvPr/>
-            </p:nvSpPr>
-            <p:spPr>
-              <a:xfrm rot="5400000">
-                <a:off x="4164368" y="849943"/>
-                <a:ext cx="641995" cy="203182"/>
-              </a:xfrm>
-              <a:prstGeom prst="rect">
-                <a:avLst/>
-              </a:prstGeom>
-              <a:solidFill>
-                <a:schemeClr val="bg1"/>
-              </a:solidFill>
-              <a:ln>
-                <a:noFill/>
-              </a:ln>
-            </p:spPr>
-            <p:style>
-              <a:lnRef idx="3">
-                <a:schemeClr val="lt1"/>
-              </a:lnRef>
-              <a:fillRef idx="1">
-                <a:schemeClr val="dk1"/>
-              </a:fillRef>
-              <a:effectRef idx="1">
-                <a:schemeClr val="dk1"/>
-              </a:effectRef>
-              <a:fontRef idx="minor">
-                <a:schemeClr val="lt1"/>
-              </a:fontRef>
-            </p:style>
-            <p:txBody>
-              <a:bodyPr rtlCol="0" anchor="ctr"/>
-              <a:lstStyle/>
-              <a:p>
-                <a:pPr algn="ctr"/>
-                <a:endParaRPr lang="en-US"/>
-              </a:p>
-            </p:txBody>
-          </p:sp>
-        </p:grpSp>
-      </p:grpSp>
       <p:sp>
         <p:nvSpPr>
           <p:cNvPr id="3" name="Espace réservé de la date 2"/>
@@ -30577,6 +29376,650 @@
           </a:p>
         </p:txBody>
       </p:sp>
+      <p:grpSp>
+        <p:nvGrpSpPr>
+          <p:cNvPr id="5" name="Groupe 4"/>
+          <p:cNvGrpSpPr/>
+          <p:nvPr/>
+        </p:nvGrpSpPr>
+        <p:grpSpPr>
+          <a:xfrm>
+            <a:off x="2112900" y="1590353"/>
+            <a:ext cx="4094685" cy="2004585"/>
+            <a:chOff x="5826977" y="3601944"/>
+            <a:chExt cx="5320600" cy="2540376"/>
+          </a:xfrm>
+        </p:grpSpPr>
+        <p:sp>
+          <p:nvSpPr>
+            <p:cNvPr id="38" name="Ellipse 37"/>
+            <p:cNvSpPr/>
+            <p:nvPr/>
+          </p:nvSpPr>
+          <p:spPr>
+            <a:xfrm>
+              <a:off x="8042157" y="4439096"/>
+              <a:ext cx="1080277" cy="1059759"/>
+            </a:xfrm>
+            <a:prstGeom prst="ellipse">
+              <a:avLst/>
+            </a:prstGeom>
+            <a:ln w="38100"/>
+          </p:spPr>
+          <p:style>
+            <a:lnRef idx="2">
+              <a:schemeClr val="dk1"/>
+            </a:lnRef>
+            <a:fillRef idx="1">
+              <a:schemeClr val="lt1"/>
+            </a:fillRef>
+            <a:effectRef idx="0">
+              <a:schemeClr val="dk1"/>
+            </a:effectRef>
+            <a:fontRef idx="minor">
+              <a:schemeClr val="dk1"/>
+            </a:fontRef>
+          </p:style>
+          <p:txBody>
+            <a:bodyPr rtlCol="0" anchor="ctr"/>
+            <a:lstStyle>
+              <a:defPPr>
+                <a:defRPr lang="fr-FR"/>
+              </a:defPPr>
+              <a:lvl1pPr marL="0" algn="l" defTabSz="914400" rtl="0" eaLnBrk="1" latinLnBrk="0" hangingPunct="1">
+                <a:defRPr sz="1800" kern="1200">
+                  <a:solidFill>
+                    <a:schemeClr val="lt1"/>
+                  </a:solidFill>
+                  <a:latin typeface="+mn-lt"/>
+                  <a:ea typeface="+mn-ea"/>
+                  <a:cs typeface="+mn-cs"/>
+                </a:defRPr>
+              </a:lvl1pPr>
+              <a:lvl2pPr marL="457200" algn="l" defTabSz="914400" rtl="0" eaLnBrk="1" latinLnBrk="0" hangingPunct="1">
+                <a:defRPr sz="1800" kern="1200">
+                  <a:solidFill>
+                    <a:schemeClr val="lt1"/>
+                  </a:solidFill>
+                  <a:latin typeface="+mn-lt"/>
+                  <a:ea typeface="+mn-ea"/>
+                  <a:cs typeface="+mn-cs"/>
+                </a:defRPr>
+              </a:lvl2pPr>
+              <a:lvl3pPr marL="914400" algn="l" defTabSz="914400" rtl="0" eaLnBrk="1" latinLnBrk="0" hangingPunct="1">
+                <a:defRPr sz="1800" kern="1200">
+                  <a:solidFill>
+                    <a:schemeClr val="lt1"/>
+                  </a:solidFill>
+                  <a:latin typeface="+mn-lt"/>
+                  <a:ea typeface="+mn-ea"/>
+                  <a:cs typeface="+mn-cs"/>
+                </a:defRPr>
+              </a:lvl3pPr>
+              <a:lvl4pPr marL="1371600" algn="l" defTabSz="914400" rtl="0" eaLnBrk="1" latinLnBrk="0" hangingPunct="1">
+                <a:defRPr sz="1800" kern="1200">
+                  <a:solidFill>
+                    <a:schemeClr val="lt1"/>
+                  </a:solidFill>
+                  <a:latin typeface="+mn-lt"/>
+                  <a:ea typeface="+mn-ea"/>
+                  <a:cs typeface="+mn-cs"/>
+                </a:defRPr>
+              </a:lvl4pPr>
+              <a:lvl5pPr marL="1828800" algn="l" defTabSz="914400" rtl="0" eaLnBrk="1" latinLnBrk="0" hangingPunct="1">
+                <a:defRPr sz="1800" kern="1200">
+                  <a:solidFill>
+                    <a:schemeClr val="lt1"/>
+                  </a:solidFill>
+                  <a:latin typeface="+mn-lt"/>
+                  <a:ea typeface="+mn-ea"/>
+                  <a:cs typeface="+mn-cs"/>
+                </a:defRPr>
+              </a:lvl5pPr>
+              <a:lvl6pPr marL="2286000" algn="l" defTabSz="914400" rtl="0" eaLnBrk="1" latinLnBrk="0" hangingPunct="1">
+                <a:defRPr sz="1800" kern="1200">
+                  <a:solidFill>
+                    <a:schemeClr val="lt1"/>
+                  </a:solidFill>
+                  <a:latin typeface="+mn-lt"/>
+                  <a:ea typeface="+mn-ea"/>
+                  <a:cs typeface="+mn-cs"/>
+                </a:defRPr>
+              </a:lvl6pPr>
+              <a:lvl7pPr marL="2743200" algn="l" defTabSz="914400" rtl="0" eaLnBrk="1" latinLnBrk="0" hangingPunct="1">
+                <a:defRPr sz="1800" kern="1200">
+                  <a:solidFill>
+                    <a:schemeClr val="lt1"/>
+                  </a:solidFill>
+                  <a:latin typeface="+mn-lt"/>
+                  <a:ea typeface="+mn-ea"/>
+                  <a:cs typeface="+mn-cs"/>
+                </a:defRPr>
+              </a:lvl7pPr>
+              <a:lvl8pPr marL="3200400" algn="l" defTabSz="914400" rtl="0" eaLnBrk="1" latinLnBrk="0" hangingPunct="1">
+                <a:defRPr sz="1800" kern="1200">
+                  <a:solidFill>
+                    <a:schemeClr val="lt1"/>
+                  </a:solidFill>
+                  <a:latin typeface="+mn-lt"/>
+                  <a:ea typeface="+mn-ea"/>
+                  <a:cs typeface="+mn-cs"/>
+                </a:defRPr>
+              </a:lvl8pPr>
+              <a:lvl9pPr marL="3657600" algn="l" defTabSz="914400" rtl="0" eaLnBrk="1" latinLnBrk="0" hangingPunct="1">
+                <a:defRPr sz="1800" kern="1200">
+                  <a:solidFill>
+                    <a:schemeClr val="lt1"/>
+                  </a:solidFill>
+                  <a:latin typeface="+mn-lt"/>
+                  <a:ea typeface="+mn-ea"/>
+                  <a:cs typeface="+mn-cs"/>
+                </a:defRPr>
+              </a:lvl9pPr>
+            </a:lstStyle>
+            <a:p>
+              <a:pPr algn="ctr"/>
+              <a:r>
+                <a:rPr lang="fr-FR" sz="4800" dirty="0"/>
+                <a:t>4</a:t>
+              </a:r>
+            </a:p>
+          </p:txBody>
+        </p:sp>
+        <p:cxnSp>
+          <p:nvCxnSpPr>
+            <p:cNvPr id="39" name="Connecteur droit avec flèche 38"/>
+            <p:cNvCxnSpPr/>
+            <p:nvPr/>
+          </p:nvCxnSpPr>
+          <p:spPr>
+            <a:xfrm flipH="1" flipV="1">
+              <a:off x="7849024" y="3799169"/>
+              <a:ext cx="448279" cy="722092"/>
+            </a:xfrm>
+            <a:prstGeom prst="straightConnector1">
+              <a:avLst/>
+            </a:prstGeom>
+            <a:ln w="38100">
+              <a:solidFill>
+                <a:schemeClr val="tx1"/>
+              </a:solidFill>
+              <a:tailEnd type="triangle"/>
+            </a:ln>
+          </p:spPr>
+          <p:style>
+            <a:lnRef idx="1">
+              <a:schemeClr val="dk1"/>
+            </a:lnRef>
+            <a:fillRef idx="0">
+              <a:schemeClr val="dk1"/>
+            </a:fillRef>
+            <a:effectRef idx="0">
+              <a:schemeClr val="dk1"/>
+            </a:effectRef>
+            <a:fontRef idx="minor">
+              <a:schemeClr val="tx1"/>
+            </a:fontRef>
+          </p:style>
+        </p:cxnSp>
+        <p:cxnSp>
+          <p:nvCxnSpPr>
+            <p:cNvPr id="40" name="Connecteur droit avec flèche 39"/>
+            <p:cNvCxnSpPr/>
+            <p:nvPr/>
+          </p:nvCxnSpPr>
+          <p:spPr>
+            <a:xfrm>
+              <a:off x="8883821" y="5420228"/>
+              <a:ext cx="448279" cy="722092"/>
+            </a:xfrm>
+            <a:prstGeom prst="straightConnector1">
+              <a:avLst/>
+            </a:prstGeom>
+            <a:ln w="38100">
+              <a:solidFill>
+                <a:schemeClr val="accent1"/>
+              </a:solidFill>
+              <a:tailEnd type="triangle"/>
+            </a:ln>
+          </p:spPr>
+          <p:style>
+            <a:lnRef idx="1">
+              <a:schemeClr val="dk1"/>
+            </a:lnRef>
+            <a:fillRef idx="0">
+              <a:schemeClr val="dk1"/>
+            </a:fillRef>
+            <a:effectRef idx="0">
+              <a:schemeClr val="dk1"/>
+            </a:effectRef>
+            <a:fontRef idx="minor">
+              <a:schemeClr val="tx1"/>
+            </a:fontRef>
+          </p:style>
+        </p:cxnSp>
+        <p:cxnSp>
+          <p:nvCxnSpPr>
+            <p:cNvPr id="46" name="Connecteur droit avec flèche 45"/>
+            <p:cNvCxnSpPr/>
+            <p:nvPr/>
+          </p:nvCxnSpPr>
+          <p:spPr>
+            <a:xfrm flipH="1">
+              <a:off x="7871431" y="5397315"/>
+              <a:ext cx="448279" cy="722092"/>
+            </a:xfrm>
+            <a:prstGeom prst="straightConnector1">
+              <a:avLst/>
+            </a:prstGeom>
+            <a:ln w="38100">
+              <a:solidFill>
+                <a:srgbClr val="FF0000"/>
+              </a:solidFill>
+              <a:tailEnd type="triangle"/>
+            </a:ln>
+          </p:spPr>
+          <p:style>
+            <a:lnRef idx="1">
+              <a:schemeClr val="dk1"/>
+            </a:lnRef>
+            <a:fillRef idx="0">
+              <a:schemeClr val="dk1"/>
+            </a:fillRef>
+            <a:effectRef idx="0">
+              <a:schemeClr val="dk1"/>
+            </a:effectRef>
+            <a:fontRef idx="minor">
+              <a:schemeClr val="tx1"/>
+            </a:fontRef>
+          </p:style>
+        </p:cxnSp>
+        <p:sp>
+          <p:nvSpPr>
+            <p:cNvPr id="47" name="ZoneTexte 8"/>
+            <p:cNvSpPr txBox="1"/>
+            <p:nvPr/>
+          </p:nvSpPr>
+          <p:spPr>
+            <a:xfrm>
+              <a:off x="8477641" y="3601944"/>
+              <a:ext cx="1289584" cy="584775"/>
+            </a:xfrm>
+            <a:prstGeom prst="rect">
+              <a:avLst/>
+            </a:prstGeom>
+            <a:noFill/>
+          </p:spPr>
+          <p:txBody>
+            <a:bodyPr wrap="none" rtlCol="0">
+              <a:spAutoFit/>
+            </a:bodyPr>
+            <a:lstStyle>
+              <a:defPPr>
+                <a:defRPr lang="fr-FR"/>
+              </a:defPPr>
+              <a:lvl1pPr marL="0" algn="l" defTabSz="914400" rtl="0" eaLnBrk="1" latinLnBrk="0" hangingPunct="1">
+                <a:defRPr sz="1800" kern="1200">
+                  <a:solidFill>
+                    <a:schemeClr val="tx1"/>
+                  </a:solidFill>
+                  <a:latin typeface="+mn-lt"/>
+                  <a:ea typeface="+mn-ea"/>
+                  <a:cs typeface="+mn-cs"/>
+                </a:defRPr>
+              </a:lvl1pPr>
+              <a:lvl2pPr marL="457200" algn="l" defTabSz="914400" rtl="0" eaLnBrk="1" latinLnBrk="0" hangingPunct="1">
+                <a:defRPr sz="1800" kern="1200">
+                  <a:solidFill>
+                    <a:schemeClr val="tx1"/>
+                  </a:solidFill>
+                  <a:latin typeface="+mn-lt"/>
+                  <a:ea typeface="+mn-ea"/>
+                  <a:cs typeface="+mn-cs"/>
+                </a:defRPr>
+              </a:lvl2pPr>
+              <a:lvl3pPr marL="914400" algn="l" defTabSz="914400" rtl="0" eaLnBrk="1" latinLnBrk="0" hangingPunct="1">
+                <a:defRPr sz="1800" kern="1200">
+                  <a:solidFill>
+                    <a:schemeClr val="tx1"/>
+                  </a:solidFill>
+                  <a:latin typeface="+mn-lt"/>
+                  <a:ea typeface="+mn-ea"/>
+                  <a:cs typeface="+mn-cs"/>
+                </a:defRPr>
+              </a:lvl3pPr>
+              <a:lvl4pPr marL="1371600" algn="l" defTabSz="914400" rtl="0" eaLnBrk="1" latinLnBrk="0" hangingPunct="1">
+                <a:defRPr sz="1800" kern="1200">
+                  <a:solidFill>
+                    <a:schemeClr val="tx1"/>
+                  </a:solidFill>
+                  <a:latin typeface="+mn-lt"/>
+                  <a:ea typeface="+mn-ea"/>
+                  <a:cs typeface="+mn-cs"/>
+                </a:defRPr>
+              </a:lvl4pPr>
+              <a:lvl5pPr marL="1828800" algn="l" defTabSz="914400" rtl="0" eaLnBrk="1" latinLnBrk="0" hangingPunct="1">
+                <a:defRPr sz="1800" kern="1200">
+                  <a:solidFill>
+                    <a:schemeClr val="tx1"/>
+                  </a:solidFill>
+                  <a:latin typeface="+mn-lt"/>
+                  <a:ea typeface="+mn-ea"/>
+                  <a:cs typeface="+mn-cs"/>
+                </a:defRPr>
+              </a:lvl5pPr>
+              <a:lvl6pPr marL="2286000" algn="l" defTabSz="914400" rtl="0" eaLnBrk="1" latinLnBrk="0" hangingPunct="1">
+                <a:defRPr sz="1800" kern="1200">
+                  <a:solidFill>
+                    <a:schemeClr val="tx1"/>
+                  </a:solidFill>
+                  <a:latin typeface="+mn-lt"/>
+                  <a:ea typeface="+mn-ea"/>
+                  <a:cs typeface="+mn-cs"/>
+                </a:defRPr>
+              </a:lvl6pPr>
+              <a:lvl7pPr marL="2743200" algn="l" defTabSz="914400" rtl="0" eaLnBrk="1" latinLnBrk="0" hangingPunct="1">
+                <a:defRPr sz="1800" kern="1200">
+                  <a:solidFill>
+                    <a:schemeClr val="tx1"/>
+                  </a:solidFill>
+                  <a:latin typeface="+mn-lt"/>
+                  <a:ea typeface="+mn-ea"/>
+                  <a:cs typeface="+mn-cs"/>
+                </a:defRPr>
+              </a:lvl7pPr>
+              <a:lvl8pPr marL="3200400" algn="l" defTabSz="914400" rtl="0" eaLnBrk="1" latinLnBrk="0" hangingPunct="1">
+                <a:defRPr sz="1800" kern="1200">
+                  <a:solidFill>
+                    <a:schemeClr val="tx1"/>
+                  </a:solidFill>
+                  <a:latin typeface="+mn-lt"/>
+                  <a:ea typeface="+mn-ea"/>
+                  <a:cs typeface="+mn-cs"/>
+                </a:defRPr>
+              </a:lvl8pPr>
+              <a:lvl9pPr marL="3657600" algn="l" defTabSz="914400" rtl="0" eaLnBrk="1" latinLnBrk="0" hangingPunct="1">
+                <a:defRPr sz="1800" kern="1200">
+                  <a:solidFill>
+                    <a:schemeClr val="tx1"/>
+                  </a:solidFill>
+                  <a:latin typeface="+mn-lt"/>
+                  <a:ea typeface="+mn-ea"/>
+                  <a:cs typeface="+mn-cs"/>
+                </a:defRPr>
+              </a:lvl9pPr>
+            </a:lstStyle>
+            <a:p>
+              <a:r>
+                <a:rPr lang="fr-FR" sz="3200" dirty="0"/>
+                <a:t>parent</a:t>
+              </a:r>
+            </a:p>
+          </p:txBody>
+        </p:sp>
+        <p:sp>
+          <p:nvSpPr>
+            <p:cNvPr id="48" name="ZoneTexte 13"/>
+            <p:cNvSpPr txBox="1"/>
+            <p:nvPr/>
+          </p:nvSpPr>
+          <p:spPr>
+            <a:xfrm>
+              <a:off x="9293159" y="5196499"/>
+              <a:ext cx="1854418" cy="584775"/>
+            </a:xfrm>
+            <a:prstGeom prst="rect">
+              <a:avLst/>
+            </a:prstGeom>
+            <a:noFill/>
+          </p:spPr>
+          <p:txBody>
+            <a:bodyPr wrap="none" rtlCol="0">
+              <a:spAutoFit/>
+            </a:bodyPr>
+            <a:lstStyle>
+              <a:defPPr>
+                <a:defRPr lang="fr-FR"/>
+              </a:defPPr>
+              <a:lvl1pPr marL="0" algn="l" defTabSz="914400" rtl="0" eaLnBrk="1" latinLnBrk="0" hangingPunct="1">
+                <a:defRPr sz="1800" kern="1200">
+                  <a:solidFill>
+                    <a:schemeClr val="tx1"/>
+                  </a:solidFill>
+                  <a:latin typeface="+mn-lt"/>
+                  <a:ea typeface="+mn-ea"/>
+                  <a:cs typeface="+mn-cs"/>
+                </a:defRPr>
+              </a:lvl1pPr>
+              <a:lvl2pPr marL="457200" algn="l" defTabSz="914400" rtl="0" eaLnBrk="1" latinLnBrk="0" hangingPunct="1">
+                <a:defRPr sz="1800" kern="1200">
+                  <a:solidFill>
+                    <a:schemeClr val="tx1"/>
+                  </a:solidFill>
+                  <a:latin typeface="+mn-lt"/>
+                  <a:ea typeface="+mn-ea"/>
+                  <a:cs typeface="+mn-cs"/>
+                </a:defRPr>
+              </a:lvl2pPr>
+              <a:lvl3pPr marL="914400" algn="l" defTabSz="914400" rtl="0" eaLnBrk="1" latinLnBrk="0" hangingPunct="1">
+                <a:defRPr sz="1800" kern="1200">
+                  <a:solidFill>
+                    <a:schemeClr val="tx1"/>
+                  </a:solidFill>
+                  <a:latin typeface="+mn-lt"/>
+                  <a:ea typeface="+mn-ea"/>
+                  <a:cs typeface="+mn-cs"/>
+                </a:defRPr>
+              </a:lvl3pPr>
+              <a:lvl4pPr marL="1371600" algn="l" defTabSz="914400" rtl="0" eaLnBrk="1" latinLnBrk="0" hangingPunct="1">
+                <a:defRPr sz="1800" kern="1200">
+                  <a:solidFill>
+                    <a:schemeClr val="tx1"/>
+                  </a:solidFill>
+                  <a:latin typeface="+mn-lt"/>
+                  <a:ea typeface="+mn-ea"/>
+                  <a:cs typeface="+mn-cs"/>
+                </a:defRPr>
+              </a:lvl4pPr>
+              <a:lvl5pPr marL="1828800" algn="l" defTabSz="914400" rtl="0" eaLnBrk="1" latinLnBrk="0" hangingPunct="1">
+                <a:defRPr sz="1800" kern="1200">
+                  <a:solidFill>
+                    <a:schemeClr val="tx1"/>
+                  </a:solidFill>
+                  <a:latin typeface="+mn-lt"/>
+                  <a:ea typeface="+mn-ea"/>
+                  <a:cs typeface="+mn-cs"/>
+                </a:defRPr>
+              </a:lvl5pPr>
+              <a:lvl6pPr marL="2286000" algn="l" defTabSz="914400" rtl="0" eaLnBrk="1" latinLnBrk="0" hangingPunct="1">
+                <a:defRPr sz="1800" kern="1200">
+                  <a:solidFill>
+                    <a:schemeClr val="tx1"/>
+                  </a:solidFill>
+                  <a:latin typeface="+mn-lt"/>
+                  <a:ea typeface="+mn-ea"/>
+                  <a:cs typeface="+mn-cs"/>
+                </a:defRPr>
+              </a:lvl6pPr>
+              <a:lvl7pPr marL="2743200" algn="l" defTabSz="914400" rtl="0" eaLnBrk="1" latinLnBrk="0" hangingPunct="1">
+                <a:defRPr sz="1800" kern="1200">
+                  <a:solidFill>
+                    <a:schemeClr val="tx1"/>
+                  </a:solidFill>
+                  <a:latin typeface="+mn-lt"/>
+                  <a:ea typeface="+mn-ea"/>
+                  <a:cs typeface="+mn-cs"/>
+                </a:defRPr>
+              </a:lvl7pPr>
+              <a:lvl8pPr marL="3200400" algn="l" defTabSz="914400" rtl="0" eaLnBrk="1" latinLnBrk="0" hangingPunct="1">
+                <a:defRPr sz="1800" kern="1200">
+                  <a:solidFill>
+                    <a:schemeClr val="tx1"/>
+                  </a:solidFill>
+                  <a:latin typeface="+mn-lt"/>
+                  <a:ea typeface="+mn-ea"/>
+                  <a:cs typeface="+mn-cs"/>
+                </a:defRPr>
+              </a:lvl8pPr>
+              <a:lvl9pPr marL="3657600" algn="l" defTabSz="914400" rtl="0" eaLnBrk="1" latinLnBrk="0" hangingPunct="1">
+                <a:defRPr sz="1800" kern="1200">
+                  <a:solidFill>
+                    <a:schemeClr val="tx1"/>
+                  </a:solidFill>
+                  <a:latin typeface="+mn-lt"/>
+                  <a:ea typeface="+mn-ea"/>
+                  <a:cs typeface="+mn-cs"/>
+                </a:defRPr>
+              </a:lvl9pPr>
+            </a:lstStyle>
+            <a:p>
+              <a:r>
+                <a:rPr lang="fr-FR" sz="3200" dirty="0">
+                  <a:solidFill>
+                    <a:schemeClr val="accent1"/>
+                  </a:solidFill>
+                </a:rPr>
+                <a:t>right </a:t>
+              </a:r>
+              <a:r>
+                <a:rPr lang="en-US" sz="3200" dirty="0">
+                  <a:solidFill>
+                    <a:schemeClr val="accent1"/>
+                  </a:solidFill>
+                </a:rPr>
+                <a:t>child</a:t>
+              </a:r>
+            </a:p>
+          </p:txBody>
+        </p:sp>
+        <p:sp>
+          <p:nvSpPr>
+            <p:cNvPr id="49" name="ZoneTexte 14"/>
+            <p:cNvSpPr txBox="1"/>
+            <p:nvPr/>
+          </p:nvSpPr>
+          <p:spPr>
+            <a:xfrm>
+              <a:off x="5826977" y="5196499"/>
+              <a:ext cx="1630190" cy="584775"/>
+            </a:xfrm>
+            <a:prstGeom prst="rect">
+              <a:avLst/>
+            </a:prstGeom>
+            <a:noFill/>
+          </p:spPr>
+          <p:txBody>
+            <a:bodyPr wrap="none" rtlCol="0">
+              <a:spAutoFit/>
+            </a:bodyPr>
+            <a:lstStyle>
+              <a:defPPr>
+                <a:defRPr lang="fr-FR"/>
+              </a:defPPr>
+              <a:lvl1pPr marL="0" algn="l" defTabSz="914400" rtl="0" eaLnBrk="1" latinLnBrk="0" hangingPunct="1">
+                <a:defRPr sz="1800" kern="1200">
+                  <a:solidFill>
+                    <a:schemeClr val="tx1"/>
+                  </a:solidFill>
+                  <a:latin typeface="+mn-lt"/>
+                  <a:ea typeface="+mn-ea"/>
+                  <a:cs typeface="+mn-cs"/>
+                </a:defRPr>
+              </a:lvl1pPr>
+              <a:lvl2pPr marL="457200" algn="l" defTabSz="914400" rtl="0" eaLnBrk="1" latinLnBrk="0" hangingPunct="1">
+                <a:defRPr sz="1800" kern="1200">
+                  <a:solidFill>
+                    <a:schemeClr val="tx1"/>
+                  </a:solidFill>
+                  <a:latin typeface="+mn-lt"/>
+                  <a:ea typeface="+mn-ea"/>
+                  <a:cs typeface="+mn-cs"/>
+                </a:defRPr>
+              </a:lvl2pPr>
+              <a:lvl3pPr marL="914400" algn="l" defTabSz="914400" rtl="0" eaLnBrk="1" latinLnBrk="0" hangingPunct="1">
+                <a:defRPr sz="1800" kern="1200">
+                  <a:solidFill>
+                    <a:schemeClr val="tx1"/>
+                  </a:solidFill>
+                  <a:latin typeface="+mn-lt"/>
+                  <a:ea typeface="+mn-ea"/>
+                  <a:cs typeface="+mn-cs"/>
+                </a:defRPr>
+              </a:lvl3pPr>
+              <a:lvl4pPr marL="1371600" algn="l" defTabSz="914400" rtl="0" eaLnBrk="1" latinLnBrk="0" hangingPunct="1">
+                <a:defRPr sz="1800" kern="1200">
+                  <a:solidFill>
+                    <a:schemeClr val="tx1"/>
+                  </a:solidFill>
+                  <a:latin typeface="+mn-lt"/>
+                  <a:ea typeface="+mn-ea"/>
+                  <a:cs typeface="+mn-cs"/>
+                </a:defRPr>
+              </a:lvl4pPr>
+              <a:lvl5pPr marL="1828800" algn="l" defTabSz="914400" rtl="0" eaLnBrk="1" latinLnBrk="0" hangingPunct="1">
+                <a:defRPr sz="1800" kern="1200">
+                  <a:solidFill>
+                    <a:schemeClr val="tx1"/>
+                  </a:solidFill>
+                  <a:latin typeface="+mn-lt"/>
+                  <a:ea typeface="+mn-ea"/>
+                  <a:cs typeface="+mn-cs"/>
+                </a:defRPr>
+              </a:lvl5pPr>
+              <a:lvl6pPr marL="2286000" algn="l" defTabSz="914400" rtl="0" eaLnBrk="1" latinLnBrk="0" hangingPunct="1">
+                <a:defRPr sz="1800" kern="1200">
+                  <a:solidFill>
+                    <a:schemeClr val="tx1"/>
+                  </a:solidFill>
+                  <a:latin typeface="+mn-lt"/>
+                  <a:ea typeface="+mn-ea"/>
+                  <a:cs typeface="+mn-cs"/>
+                </a:defRPr>
+              </a:lvl6pPr>
+              <a:lvl7pPr marL="2743200" algn="l" defTabSz="914400" rtl="0" eaLnBrk="1" latinLnBrk="0" hangingPunct="1">
+                <a:defRPr sz="1800" kern="1200">
+                  <a:solidFill>
+                    <a:schemeClr val="tx1"/>
+                  </a:solidFill>
+                  <a:latin typeface="+mn-lt"/>
+                  <a:ea typeface="+mn-ea"/>
+                  <a:cs typeface="+mn-cs"/>
+                </a:defRPr>
+              </a:lvl7pPr>
+              <a:lvl8pPr marL="3200400" algn="l" defTabSz="914400" rtl="0" eaLnBrk="1" latinLnBrk="0" hangingPunct="1">
+                <a:defRPr sz="1800" kern="1200">
+                  <a:solidFill>
+                    <a:schemeClr val="tx1"/>
+                  </a:solidFill>
+                  <a:latin typeface="+mn-lt"/>
+                  <a:ea typeface="+mn-ea"/>
+                  <a:cs typeface="+mn-cs"/>
+                </a:defRPr>
+              </a:lvl8pPr>
+              <a:lvl9pPr marL="3657600" algn="l" defTabSz="914400" rtl="0" eaLnBrk="1" latinLnBrk="0" hangingPunct="1">
+                <a:defRPr sz="1800" kern="1200">
+                  <a:solidFill>
+                    <a:schemeClr val="tx1"/>
+                  </a:solidFill>
+                  <a:latin typeface="+mn-lt"/>
+                  <a:ea typeface="+mn-ea"/>
+                  <a:cs typeface="+mn-cs"/>
+                </a:defRPr>
+              </a:lvl9pPr>
+            </a:lstStyle>
+            <a:p>
+              <a:r>
+                <a:rPr lang="en-US" sz="3200" dirty="0">
+                  <a:solidFill>
+                    <a:srgbClr val="FF0000"/>
+                  </a:solidFill>
+                </a:rPr>
+                <a:t>left child</a:t>
+              </a:r>
+            </a:p>
+          </p:txBody>
+        </p:sp>
+      </p:grpSp>
     </p:spTree>
     <p:extLst>
       <p:ext uri="{BB962C8B-B14F-4D97-AF65-F5344CB8AC3E}">
@@ -30821,17 +30264,16 @@
             </a:r>
           </a:p>
           <a:p>
+            <a:r>
+              <a:rPr lang="en-US" sz="3200" dirty="0"/>
+              <a:t>Implemented as a type invariant</a:t>
+            </a:r>
+          </a:p>
+          <a:p>
             <a:pPr lvl="1"/>
             <a:r>
               <a:rPr lang="en-US" sz="2800" dirty="0"/>
-              <a:t>Parent – child links are consistent</a:t>
-            </a:r>
-          </a:p>
-          <a:p>
-            <a:pPr lvl="1"/>
-            <a:r>
-              <a:rPr lang="en-US" sz="2800" dirty="0"/>
-              <a:t>Roots have no parents</a:t>
+              <a:t>Should hold outside of the type immediate scope</a:t>
             </a:r>
           </a:p>
         </p:txBody>

</xml_diff>